<commit_message>
1 slide with Process overview is added
</commit_message>
<xml_diff>
--- a/2.Testing_types/Testing types.pptx
+++ b/2.Testing_types/Testing types.pptx
@@ -5,7 +5,7 @@
     <p:sldMasterId id="2147483648" r:id="rId1"/>
   </p:sldMasterIdLst>
   <p:notesMasterIdLst>
-    <p:notesMasterId r:id="rId24"/>
+    <p:notesMasterId r:id="rId25"/>
   </p:notesMasterIdLst>
   <p:sldIdLst>
     <p:sldId id="271" r:id="rId2"/>
@@ -17,19 +17,20 @@
     <p:sldId id="259" r:id="rId8"/>
     <p:sldId id="285" r:id="rId9"/>
     <p:sldId id="283" r:id="rId10"/>
-    <p:sldId id="272" r:id="rId11"/>
-    <p:sldId id="274" r:id="rId12"/>
-    <p:sldId id="273" r:id="rId13"/>
-    <p:sldId id="281" r:id="rId14"/>
-    <p:sldId id="267" r:id="rId15"/>
-    <p:sldId id="284" r:id="rId16"/>
-    <p:sldId id="276" r:id="rId17"/>
-    <p:sldId id="268" r:id="rId18"/>
-    <p:sldId id="282" r:id="rId19"/>
-    <p:sldId id="269" r:id="rId20"/>
-    <p:sldId id="270" r:id="rId21"/>
-    <p:sldId id="280" r:id="rId22"/>
-    <p:sldId id="278" r:id="rId23"/>
+    <p:sldId id="286" r:id="rId11"/>
+    <p:sldId id="272" r:id="rId12"/>
+    <p:sldId id="274" r:id="rId13"/>
+    <p:sldId id="273" r:id="rId14"/>
+    <p:sldId id="281" r:id="rId15"/>
+    <p:sldId id="267" r:id="rId16"/>
+    <p:sldId id="284" r:id="rId17"/>
+    <p:sldId id="276" r:id="rId18"/>
+    <p:sldId id="268" r:id="rId19"/>
+    <p:sldId id="282" r:id="rId20"/>
+    <p:sldId id="269" r:id="rId21"/>
+    <p:sldId id="270" r:id="rId22"/>
+    <p:sldId id="280" r:id="rId23"/>
+    <p:sldId id="278" r:id="rId24"/>
   </p:sldIdLst>
   <p:sldSz cx="9144000" cy="6858000" type="screen4x3"/>
   <p:notesSz cx="6858000" cy="9144000"/>
@@ -130,7 +131,7 @@
   </p:defaultTextStyle>
   <p:extLst>
     <p:ext uri="{EFAFB233-063F-42B5-8137-9DF3F51BA10A}">
-      <p15:sldGuideLst xmlns:p15="http://schemas.microsoft.com/office/powerpoint/2012/main" xmlns="">
+      <p15:sldGuideLst xmlns="" xmlns:p15="http://schemas.microsoft.com/office/powerpoint/2012/main">
         <p15:guide id="1" orient="horz" pos="2160">
           <p15:clr>
             <a:srgbClr val="A4A3A4"/>
@@ -230,7 +231,7 @@
             <a:fld id="{2C4D6FCC-EC97-452D-A9D5-DBD8B87D3B9F}" type="datetimeFigureOut">
               <a:rPr lang="en-US" smtClean="0"/>
               <a:pPr/>
-              <a:t>11/28/2014</a:t>
+              <a:t>12/2/2014</a:t>
             </a:fld>
             <a:endParaRPr lang="en-US"/>
           </a:p>
@@ -565,7 +566,7 @@
             <a:fld id="{E3A4558B-DEAA-4BDB-B9ED-8DEC21E7EB4A}" type="slidenum">
               <a:rPr lang="en-US" smtClean="0"/>
               <a:pPr/>
-              <a:t>11</a:t>
+              <a:t>12</a:t>
             </a:fld>
             <a:endParaRPr lang="en-US"/>
           </a:p>
@@ -766,7 +767,7 @@
             <a:fld id="{1D8BD707-D9CF-40AE-B4C6-C98DA3205C09}" type="datetimeFigureOut">
               <a:rPr lang="en-US" smtClean="0"/>
               <a:pPr/>
-              <a:t>11/28/2014</a:t>
+              <a:t>12/2/2014</a:t>
             </a:fld>
             <a:endParaRPr lang="en-US"/>
           </a:p>
@@ -933,7 +934,7 @@
             <a:fld id="{1D8BD707-D9CF-40AE-B4C6-C98DA3205C09}" type="datetimeFigureOut">
               <a:rPr lang="en-US" smtClean="0"/>
               <a:pPr/>
-              <a:t>11/28/2014</a:t>
+              <a:t>12/2/2014</a:t>
             </a:fld>
             <a:endParaRPr lang="en-US"/>
           </a:p>
@@ -1110,7 +1111,7 @@
             <a:fld id="{1D8BD707-D9CF-40AE-B4C6-C98DA3205C09}" type="datetimeFigureOut">
               <a:rPr lang="en-US" smtClean="0"/>
               <a:pPr/>
-              <a:t>11/28/2014</a:t>
+              <a:t>12/2/2014</a:t>
             </a:fld>
             <a:endParaRPr lang="en-US"/>
           </a:p>
@@ -1277,7 +1278,7 @@
             <a:fld id="{1D8BD707-D9CF-40AE-B4C6-C98DA3205C09}" type="datetimeFigureOut">
               <a:rPr lang="en-US" smtClean="0"/>
               <a:pPr/>
-              <a:t>11/28/2014</a:t>
+              <a:t>12/2/2014</a:t>
             </a:fld>
             <a:endParaRPr lang="en-US"/>
           </a:p>
@@ -1520,7 +1521,7 @@
             <a:fld id="{1D8BD707-D9CF-40AE-B4C6-C98DA3205C09}" type="datetimeFigureOut">
               <a:rPr lang="en-US" smtClean="0"/>
               <a:pPr/>
-              <a:t>11/28/2014</a:t>
+              <a:t>12/2/2014</a:t>
             </a:fld>
             <a:endParaRPr lang="en-US"/>
           </a:p>
@@ -1805,7 +1806,7 @@
             <a:fld id="{1D8BD707-D9CF-40AE-B4C6-C98DA3205C09}" type="datetimeFigureOut">
               <a:rPr lang="en-US" smtClean="0"/>
               <a:pPr/>
-              <a:t>11/28/2014</a:t>
+              <a:t>12/2/2014</a:t>
             </a:fld>
             <a:endParaRPr lang="en-US"/>
           </a:p>
@@ -2224,7 +2225,7 @@
             <a:fld id="{1D8BD707-D9CF-40AE-B4C6-C98DA3205C09}" type="datetimeFigureOut">
               <a:rPr lang="en-US" smtClean="0"/>
               <a:pPr/>
-              <a:t>11/28/2014</a:t>
+              <a:t>12/2/2014</a:t>
             </a:fld>
             <a:endParaRPr lang="en-US"/>
           </a:p>
@@ -2339,7 +2340,7 @@
             <a:fld id="{1D8BD707-D9CF-40AE-B4C6-C98DA3205C09}" type="datetimeFigureOut">
               <a:rPr lang="en-US" smtClean="0"/>
               <a:pPr/>
-              <a:t>11/28/2014</a:t>
+              <a:t>12/2/2014</a:t>
             </a:fld>
             <a:endParaRPr lang="en-US"/>
           </a:p>
@@ -2431,7 +2432,7 @@
             <a:fld id="{1D8BD707-D9CF-40AE-B4C6-C98DA3205C09}" type="datetimeFigureOut">
               <a:rPr lang="en-US" smtClean="0"/>
               <a:pPr/>
-              <a:t>11/28/2014</a:t>
+              <a:t>12/2/2014</a:t>
             </a:fld>
             <a:endParaRPr lang="en-US"/>
           </a:p>
@@ -2705,7 +2706,7 @@
             <a:fld id="{1D8BD707-D9CF-40AE-B4C6-C98DA3205C09}" type="datetimeFigureOut">
               <a:rPr lang="en-US" smtClean="0"/>
               <a:pPr/>
-              <a:t>11/28/2014</a:t>
+              <a:t>12/2/2014</a:t>
             </a:fld>
             <a:endParaRPr lang="en-US"/>
           </a:p>
@@ -2955,7 +2956,7 @@
             <a:fld id="{1D8BD707-D9CF-40AE-B4C6-C98DA3205C09}" type="datetimeFigureOut">
               <a:rPr lang="en-US" smtClean="0"/>
               <a:pPr/>
-              <a:t>11/28/2014</a:t>
+              <a:t>12/2/2014</a:t>
             </a:fld>
             <a:endParaRPr lang="en-US"/>
           </a:p>
@@ -3174,7 +3175,7 @@
             <a:fld id="{1D8BD707-D9CF-40AE-B4C6-C98DA3205C09}" type="datetimeFigureOut">
               <a:rPr lang="en-US" smtClean="0"/>
               <a:pPr/>
-              <a:t>11/28/2014</a:t>
+              <a:t>12/2/2014</a:t>
             </a:fld>
             <a:endParaRPr lang="en-US"/>
           </a:p>
@@ -3679,6 +3680,1598 @@
       </p:grpSpPr>
       <p:sp>
         <p:nvSpPr>
+          <p:cNvPr id="9" name="Овал 8"/>
+          <p:cNvSpPr/>
+          <p:nvPr/>
+        </p:nvSpPr>
+        <p:spPr>
+          <a:xfrm>
+            <a:off x="2831265" y="821796"/>
+            <a:ext cx="1371209" cy="432048"/>
+          </a:xfrm>
+          <a:prstGeom prst="ellipse">
+            <a:avLst/>
+          </a:prstGeom>
+          <a:solidFill>
+            <a:schemeClr val="accent2">
+              <a:lumMod val="60000"/>
+              <a:lumOff val="40000"/>
+            </a:schemeClr>
+          </a:solidFill>
+        </p:spPr>
+        <p:style>
+          <a:lnRef idx="2">
+            <a:schemeClr val="accent1">
+              <a:shade val="50000"/>
+            </a:schemeClr>
+          </a:lnRef>
+          <a:fillRef idx="1">
+            <a:schemeClr val="accent1"/>
+          </a:fillRef>
+          <a:effectRef idx="0">
+            <a:schemeClr val="accent1"/>
+          </a:effectRef>
+          <a:fontRef idx="minor">
+            <a:schemeClr val="lt1"/>
+          </a:fontRef>
+        </p:style>
+        <p:txBody>
+          <a:bodyPr rtlCol="0" anchor="ctr"/>
+          <a:lstStyle/>
+          <a:p>
+            <a:pPr algn="ctr"/>
+            <a:r>
+              <a:rPr lang="en-US" sz="1400" dirty="0" smtClean="0"/>
+              <a:t>Testability</a:t>
+            </a:r>
+            <a:endParaRPr lang="en-US" sz="1400" dirty="0"/>
+          </a:p>
+        </p:txBody>
+      </p:sp>
+      <p:cxnSp>
+        <p:nvCxnSpPr>
+          <p:cNvPr id="17" name="Прямая со стрелкой 16"/>
+          <p:cNvCxnSpPr>
+            <a:endCxn id="9" idx="0"/>
+          </p:cNvCxnSpPr>
+          <p:nvPr/>
+        </p:nvCxnSpPr>
+        <p:spPr>
+          <a:xfrm>
+            <a:off x="3497435" y="677780"/>
+            <a:ext cx="19435" cy="144016"/>
+          </a:xfrm>
+          <a:prstGeom prst="straightConnector1">
+            <a:avLst/>
+          </a:prstGeom>
+          <a:ln>
+            <a:tailEnd type="arrow"/>
+          </a:ln>
+        </p:spPr>
+        <p:style>
+          <a:lnRef idx="1">
+            <a:schemeClr val="accent1"/>
+          </a:lnRef>
+          <a:fillRef idx="0">
+            <a:schemeClr val="accent1"/>
+          </a:fillRef>
+          <a:effectRef idx="0">
+            <a:schemeClr val="accent1"/>
+          </a:effectRef>
+          <a:fontRef idx="minor">
+            <a:schemeClr val="tx1"/>
+          </a:fontRef>
+        </p:style>
+      </p:cxnSp>
+      <p:sp>
+        <p:nvSpPr>
+          <p:cNvPr id="19" name="Скругленный прямоугольник 18"/>
+          <p:cNvSpPr/>
+          <p:nvPr/>
+        </p:nvSpPr>
+        <p:spPr>
+          <a:xfrm>
+            <a:off x="3138352" y="1469868"/>
+            <a:ext cx="792088" cy="360040"/>
+          </a:xfrm>
+          <a:prstGeom prst="roundRect">
+            <a:avLst/>
+          </a:prstGeom>
+          <a:solidFill>
+            <a:schemeClr val="accent4">
+              <a:lumMod val="50000"/>
+            </a:schemeClr>
+          </a:solidFill>
+        </p:spPr>
+        <p:style>
+          <a:lnRef idx="2">
+            <a:schemeClr val="accent1">
+              <a:shade val="50000"/>
+            </a:schemeClr>
+          </a:lnRef>
+          <a:fillRef idx="1">
+            <a:schemeClr val="accent1"/>
+          </a:fillRef>
+          <a:effectRef idx="0">
+            <a:schemeClr val="accent1"/>
+          </a:effectRef>
+          <a:fontRef idx="minor">
+            <a:schemeClr val="lt1"/>
+          </a:fontRef>
+        </p:style>
+        <p:txBody>
+          <a:bodyPr rtlCol="0" anchor="ctr"/>
+          <a:lstStyle/>
+          <a:p>
+            <a:pPr algn="ctr"/>
+            <a:r>
+              <a:rPr lang="en-US" sz="1400" dirty="0" smtClean="0"/>
+              <a:t>Unit</a:t>
+            </a:r>
+            <a:endParaRPr lang="en-US" sz="1400" dirty="0"/>
+          </a:p>
+        </p:txBody>
+      </p:sp>
+      <p:sp>
+        <p:nvSpPr>
+          <p:cNvPr id="20" name="Скругленный прямоугольник 19"/>
+          <p:cNvSpPr/>
+          <p:nvPr/>
+        </p:nvSpPr>
+        <p:spPr>
+          <a:xfrm>
+            <a:off x="2938877" y="2034238"/>
+            <a:ext cx="1155984" cy="360040"/>
+          </a:xfrm>
+          <a:prstGeom prst="roundRect">
+            <a:avLst/>
+          </a:prstGeom>
+          <a:solidFill>
+            <a:schemeClr val="accent4">
+              <a:lumMod val="50000"/>
+            </a:schemeClr>
+          </a:solidFill>
+        </p:spPr>
+        <p:style>
+          <a:lnRef idx="2">
+            <a:schemeClr val="accent1">
+              <a:shade val="50000"/>
+            </a:schemeClr>
+          </a:lnRef>
+          <a:fillRef idx="1">
+            <a:schemeClr val="accent1"/>
+          </a:fillRef>
+          <a:effectRef idx="0">
+            <a:schemeClr val="accent1"/>
+          </a:effectRef>
+          <a:fontRef idx="minor">
+            <a:schemeClr val="lt1"/>
+          </a:fontRef>
+        </p:style>
+        <p:txBody>
+          <a:bodyPr rtlCol="0" anchor="ctr"/>
+          <a:lstStyle/>
+          <a:p>
+            <a:pPr algn="ctr"/>
+            <a:r>
+              <a:rPr lang="en-US" sz="1400" dirty="0" smtClean="0"/>
+              <a:t>Integration</a:t>
+            </a:r>
+            <a:endParaRPr lang="en-US" sz="1400" dirty="0"/>
+          </a:p>
+        </p:txBody>
+      </p:sp>
+      <p:sp>
+        <p:nvSpPr>
+          <p:cNvPr id="21" name="Скругленный прямоугольник 20"/>
+          <p:cNvSpPr/>
+          <p:nvPr/>
+        </p:nvSpPr>
+        <p:spPr>
+          <a:xfrm>
+            <a:off x="3051146" y="2587824"/>
+            <a:ext cx="936104" cy="360040"/>
+          </a:xfrm>
+          <a:prstGeom prst="roundRect">
+            <a:avLst/>
+          </a:prstGeom>
+          <a:solidFill>
+            <a:schemeClr val="bg1">
+              <a:lumMod val="65000"/>
+            </a:schemeClr>
+          </a:solidFill>
+        </p:spPr>
+        <p:style>
+          <a:lnRef idx="2">
+            <a:schemeClr val="accent1">
+              <a:shade val="50000"/>
+            </a:schemeClr>
+          </a:lnRef>
+          <a:fillRef idx="1">
+            <a:schemeClr val="accent1"/>
+          </a:fillRef>
+          <a:effectRef idx="0">
+            <a:schemeClr val="accent1"/>
+          </a:effectRef>
+          <a:fontRef idx="minor">
+            <a:schemeClr val="lt1"/>
+          </a:fontRef>
+        </p:style>
+        <p:txBody>
+          <a:bodyPr rtlCol="0" anchor="ctr"/>
+          <a:lstStyle/>
+          <a:p>
+            <a:pPr algn="ctr"/>
+            <a:r>
+              <a:rPr lang="en-US" sz="1400" dirty="0" smtClean="0"/>
+              <a:t>Smoke</a:t>
+            </a:r>
+            <a:endParaRPr lang="en-US" sz="1400" dirty="0"/>
+          </a:p>
+        </p:txBody>
+      </p:sp>
+      <p:sp>
+        <p:nvSpPr>
+          <p:cNvPr id="22" name="Скругленный прямоугольник 21"/>
+          <p:cNvSpPr/>
+          <p:nvPr/>
+        </p:nvSpPr>
+        <p:spPr>
+          <a:xfrm>
+            <a:off x="3840694" y="4877328"/>
+            <a:ext cx="3139751" cy="1589390"/>
+          </a:xfrm>
+          <a:prstGeom prst="roundRect">
+            <a:avLst/>
+          </a:prstGeom>
+          <a:solidFill>
+            <a:srgbClr val="00B050"/>
+          </a:solidFill>
+        </p:spPr>
+        <p:style>
+          <a:lnRef idx="2">
+            <a:schemeClr val="accent1">
+              <a:shade val="50000"/>
+            </a:schemeClr>
+          </a:lnRef>
+          <a:fillRef idx="1">
+            <a:schemeClr val="accent1"/>
+          </a:fillRef>
+          <a:effectRef idx="0">
+            <a:schemeClr val="accent1"/>
+          </a:effectRef>
+          <a:fontRef idx="minor">
+            <a:schemeClr val="lt1"/>
+          </a:fontRef>
+        </p:style>
+        <p:txBody>
+          <a:bodyPr rtlCol="0" anchor="ctr"/>
+          <a:lstStyle/>
+          <a:p>
+            <a:pPr algn="ctr"/>
+            <a:r>
+              <a:rPr lang="en-US" sz="1400" dirty="0" smtClean="0"/>
+              <a:t>GUI/ Usability/</a:t>
+            </a:r>
+            <a:r>
+              <a:rPr lang="en-US" sz="1400" dirty="0" err="1" smtClean="0"/>
+              <a:t>Multibrowser</a:t>
+            </a:r>
+            <a:r>
+              <a:rPr lang="en-US" sz="1400" dirty="0" smtClean="0"/>
+              <a:t>(</a:t>
+            </a:r>
+            <a:r>
+              <a:rPr lang="en-US" sz="1400" dirty="0" err="1" smtClean="0"/>
+              <a:t>Crossbrowser</a:t>
+            </a:r>
+            <a:r>
+              <a:rPr lang="en-US" sz="1400" dirty="0" smtClean="0"/>
+              <a:t>)</a:t>
+            </a:r>
+            <a:endParaRPr lang="en-US" sz="1400" dirty="0"/>
+          </a:p>
+          <a:p>
+            <a:pPr algn="ctr"/>
+            <a:r>
+              <a:rPr lang="en-US" sz="1400" dirty="0" smtClean="0"/>
+              <a:t>Security</a:t>
+            </a:r>
+          </a:p>
+          <a:p>
+            <a:pPr algn="ctr"/>
+            <a:r>
+              <a:rPr lang="en-US" sz="1400" dirty="0" smtClean="0"/>
+              <a:t>Performance/Load/Stress</a:t>
+            </a:r>
+            <a:endParaRPr lang="en-US" sz="1400" dirty="0"/>
+          </a:p>
+          <a:p>
+            <a:pPr algn="ctr"/>
+            <a:r>
+              <a:rPr lang="en-US" sz="1400" dirty="0" smtClean="0"/>
+              <a:t>Localization</a:t>
+            </a:r>
+          </a:p>
+          <a:p>
+            <a:pPr algn="ctr"/>
+            <a:r>
+              <a:rPr lang="en-US" sz="1400" dirty="0" smtClean="0"/>
+              <a:t>Configuration</a:t>
+            </a:r>
+          </a:p>
+          <a:p>
+            <a:pPr algn="ctr"/>
+            <a:r>
+              <a:rPr lang="en-US" sz="1400" dirty="0" smtClean="0"/>
+              <a:t>Installation</a:t>
+            </a:r>
+            <a:endParaRPr lang="en-US" sz="1400" dirty="0"/>
+          </a:p>
+        </p:txBody>
+      </p:sp>
+      <p:sp>
+        <p:nvSpPr>
+          <p:cNvPr id="23" name="Скругленный прямоугольник 22"/>
+          <p:cNvSpPr/>
+          <p:nvPr/>
+        </p:nvSpPr>
+        <p:spPr>
+          <a:xfrm>
+            <a:off x="1092959" y="4146125"/>
+            <a:ext cx="877036" cy="519405"/>
+          </a:xfrm>
+          <a:prstGeom prst="roundRect">
+            <a:avLst/>
+          </a:prstGeom>
+        </p:spPr>
+        <p:style>
+          <a:lnRef idx="2">
+            <a:schemeClr val="accent1">
+              <a:shade val="50000"/>
+            </a:schemeClr>
+          </a:lnRef>
+          <a:fillRef idx="1">
+            <a:schemeClr val="accent1"/>
+          </a:fillRef>
+          <a:effectRef idx="0">
+            <a:schemeClr val="accent1"/>
+          </a:effectRef>
+          <a:fontRef idx="minor">
+            <a:schemeClr val="lt1"/>
+          </a:fontRef>
+        </p:style>
+        <p:txBody>
+          <a:bodyPr rtlCol="0" anchor="ctr"/>
+          <a:lstStyle/>
+          <a:p>
+            <a:pPr algn="ctr"/>
+            <a:r>
+              <a:rPr lang="en-US" sz="1400" dirty="0" smtClean="0"/>
+              <a:t>Change </a:t>
+            </a:r>
+            <a:endParaRPr lang="en-US" sz="1400" dirty="0"/>
+          </a:p>
+        </p:txBody>
+      </p:sp>
+      <p:sp>
+        <p:nvSpPr>
+          <p:cNvPr id="24" name="Скругленный прямоугольник 23"/>
+          <p:cNvSpPr/>
+          <p:nvPr/>
+        </p:nvSpPr>
+        <p:spPr>
+          <a:xfrm>
+            <a:off x="1687096" y="3346699"/>
+            <a:ext cx="1366555" cy="576064"/>
+          </a:xfrm>
+          <a:prstGeom prst="roundRect">
+            <a:avLst/>
+          </a:prstGeom>
+        </p:spPr>
+        <p:style>
+          <a:lnRef idx="2">
+            <a:schemeClr val="accent1">
+              <a:shade val="50000"/>
+            </a:schemeClr>
+          </a:lnRef>
+          <a:fillRef idx="1">
+            <a:schemeClr val="accent1"/>
+          </a:fillRef>
+          <a:effectRef idx="0">
+            <a:schemeClr val="accent1"/>
+          </a:effectRef>
+          <a:fontRef idx="minor">
+            <a:schemeClr val="lt1"/>
+          </a:fontRef>
+        </p:style>
+        <p:txBody>
+          <a:bodyPr rtlCol="0" anchor="ctr"/>
+          <a:lstStyle/>
+          <a:p>
+            <a:pPr algn="ctr"/>
+            <a:r>
+              <a:rPr lang="en-US" sz="1400" dirty="0" smtClean="0"/>
+              <a:t>Functional </a:t>
+            </a:r>
+            <a:endParaRPr lang="en-US" sz="1400" dirty="0"/>
+          </a:p>
+        </p:txBody>
+      </p:sp>
+      <p:sp>
+        <p:nvSpPr>
+          <p:cNvPr id="25" name="Скругленный прямоугольник 24"/>
+          <p:cNvSpPr/>
+          <p:nvPr/>
+        </p:nvSpPr>
+        <p:spPr>
+          <a:xfrm>
+            <a:off x="1556801" y="4877328"/>
+            <a:ext cx="1227730" cy="360040"/>
+          </a:xfrm>
+          <a:prstGeom prst="roundRect">
+            <a:avLst/>
+          </a:prstGeom>
+        </p:spPr>
+        <p:style>
+          <a:lnRef idx="2">
+            <a:schemeClr val="accent1">
+              <a:shade val="50000"/>
+            </a:schemeClr>
+          </a:lnRef>
+          <a:fillRef idx="1">
+            <a:schemeClr val="accent1"/>
+          </a:fillRef>
+          <a:effectRef idx="0">
+            <a:schemeClr val="accent1"/>
+          </a:effectRef>
+          <a:fontRef idx="minor">
+            <a:schemeClr val="lt1"/>
+          </a:fontRef>
+        </p:style>
+        <p:txBody>
+          <a:bodyPr rtlCol="0" anchor="ctr"/>
+          <a:lstStyle/>
+          <a:p>
+            <a:pPr algn="ctr"/>
+            <a:r>
+              <a:rPr lang="en-US" sz="1400" dirty="0" smtClean="0"/>
+              <a:t>Regression</a:t>
+            </a:r>
+            <a:endParaRPr lang="en-US" sz="1400" dirty="0"/>
+          </a:p>
+        </p:txBody>
+      </p:sp>
+      <p:cxnSp>
+        <p:nvCxnSpPr>
+          <p:cNvPr id="27" name="Прямая со стрелкой 26"/>
+          <p:cNvCxnSpPr>
+            <a:stCxn id="9" idx="4"/>
+            <a:endCxn id="19" idx="0"/>
+          </p:cNvCxnSpPr>
+          <p:nvPr/>
+        </p:nvCxnSpPr>
+        <p:spPr>
+          <a:xfrm>
+            <a:off x="3516870" y="1253844"/>
+            <a:ext cx="17526" cy="216024"/>
+          </a:xfrm>
+          <a:prstGeom prst="straightConnector1">
+            <a:avLst/>
+          </a:prstGeom>
+          <a:ln>
+            <a:tailEnd type="arrow"/>
+          </a:ln>
+        </p:spPr>
+        <p:style>
+          <a:lnRef idx="1">
+            <a:schemeClr val="accent1"/>
+          </a:lnRef>
+          <a:fillRef idx="0">
+            <a:schemeClr val="accent1"/>
+          </a:fillRef>
+          <a:effectRef idx="0">
+            <a:schemeClr val="accent1"/>
+          </a:effectRef>
+          <a:fontRef idx="minor">
+            <a:schemeClr val="tx1"/>
+          </a:fontRef>
+        </p:style>
+      </p:cxnSp>
+      <p:cxnSp>
+        <p:nvCxnSpPr>
+          <p:cNvPr id="29" name="Прямая со стрелкой 28"/>
+          <p:cNvCxnSpPr>
+            <a:stCxn id="19" idx="2"/>
+            <a:endCxn id="20" idx="0"/>
+          </p:cNvCxnSpPr>
+          <p:nvPr/>
+        </p:nvCxnSpPr>
+        <p:spPr>
+          <a:xfrm flipH="1">
+            <a:off x="3516869" y="1829908"/>
+            <a:ext cx="17527" cy="204330"/>
+          </a:xfrm>
+          <a:prstGeom prst="straightConnector1">
+            <a:avLst/>
+          </a:prstGeom>
+          <a:ln>
+            <a:tailEnd type="arrow"/>
+          </a:ln>
+        </p:spPr>
+        <p:style>
+          <a:lnRef idx="1">
+            <a:schemeClr val="accent1"/>
+          </a:lnRef>
+          <a:fillRef idx="0">
+            <a:schemeClr val="accent1"/>
+          </a:fillRef>
+          <a:effectRef idx="0">
+            <a:schemeClr val="accent1"/>
+          </a:effectRef>
+          <a:fontRef idx="minor">
+            <a:schemeClr val="tx1"/>
+          </a:fontRef>
+        </p:style>
+      </p:cxnSp>
+      <p:cxnSp>
+        <p:nvCxnSpPr>
+          <p:cNvPr id="37" name="Прямая со стрелкой 36"/>
+          <p:cNvCxnSpPr>
+            <a:stCxn id="20" idx="2"/>
+            <a:endCxn id="21" idx="0"/>
+          </p:cNvCxnSpPr>
+          <p:nvPr/>
+        </p:nvCxnSpPr>
+        <p:spPr>
+          <a:xfrm>
+            <a:off x="3516869" y="2394278"/>
+            <a:ext cx="2329" cy="193546"/>
+          </a:xfrm>
+          <a:prstGeom prst="straightConnector1">
+            <a:avLst/>
+          </a:prstGeom>
+          <a:ln>
+            <a:tailEnd type="arrow"/>
+          </a:ln>
+        </p:spPr>
+        <p:style>
+          <a:lnRef idx="1">
+            <a:schemeClr val="accent1"/>
+          </a:lnRef>
+          <a:fillRef idx="0">
+            <a:schemeClr val="accent1"/>
+          </a:fillRef>
+          <a:effectRef idx="0">
+            <a:schemeClr val="accent1"/>
+          </a:effectRef>
+          <a:fontRef idx="minor">
+            <a:schemeClr val="tx1"/>
+          </a:fontRef>
+        </p:style>
+      </p:cxnSp>
+      <p:cxnSp>
+        <p:nvCxnSpPr>
+          <p:cNvPr id="46" name="Прямая со стрелкой 45"/>
+          <p:cNvCxnSpPr>
+            <a:stCxn id="21" idx="2"/>
+            <a:endCxn id="24" idx="0"/>
+          </p:cNvCxnSpPr>
+          <p:nvPr/>
+        </p:nvCxnSpPr>
+        <p:spPr>
+          <a:xfrm flipH="1">
+            <a:off x="2370374" y="2947864"/>
+            <a:ext cx="1148824" cy="398835"/>
+          </a:xfrm>
+          <a:prstGeom prst="straightConnector1">
+            <a:avLst/>
+          </a:prstGeom>
+          <a:ln>
+            <a:tailEnd type="arrow"/>
+          </a:ln>
+        </p:spPr>
+        <p:style>
+          <a:lnRef idx="1">
+            <a:schemeClr val="accent1"/>
+          </a:lnRef>
+          <a:fillRef idx="0">
+            <a:schemeClr val="accent1"/>
+          </a:fillRef>
+          <a:effectRef idx="0">
+            <a:schemeClr val="accent1"/>
+          </a:effectRef>
+          <a:fontRef idx="minor">
+            <a:schemeClr val="tx1"/>
+          </a:fontRef>
+        </p:style>
+      </p:cxnSp>
+      <p:cxnSp>
+        <p:nvCxnSpPr>
+          <p:cNvPr id="68" name="Прямая со стрелкой 67"/>
+          <p:cNvCxnSpPr>
+            <a:stCxn id="24" idx="2"/>
+            <a:endCxn id="23" idx="0"/>
+          </p:cNvCxnSpPr>
+          <p:nvPr/>
+        </p:nvCxnSpPr>
+        <p:spPr>
+          <a:xfrm flipH="1">
+            <a:off x="1531477" y="3922763"/>
+            <a:ext cx="838897" cy="223362"/>
+          </a:xfrm>
+          <a:prstGeom prst="straightConnector1">
+            <a:avLst/>
+          </a:prstGeom>
+          <a:ln>
+            <a:tailEnd type="arrow"/>
+          </a:ln>
+        </p:spPr>
+        <p:style>
+          <a:lnRef idx="1">
+            <a:schemeClr val="accent1"/>
+          </a:lnRef>
+          <a:fillRef idx="0">
+            <a:schemeClr val="accent1"/>
+          </a:fillRef>
+          <a:effectRef idx="0">
+            <a:schemeClr val="accent1"/>
+          </a:effectRef>
+          <a:fontRef idx="minor">
+            <a:schemeClr val="tx1"/>
+          </a:fontRef>
+        </p:style>
+      </p:cxnSp>
+      <p:sp>
+        <p:nvSpPr>
+          <p:cNvPr id="159" name="Левая фигурная скобка 158"/>
+          <p:cNvSpPr/>
+          <p:nvPr/>
+        </p:nvSpPr>
+        <p:spPr>
+          <a:xfrm>
+            <a:off x="683567" y="2599111"/>
+            <a:ext cx="283839" cy="3867607"/>
+          </a:xfrm>
+          <a:prstGeom prst="leftBrace">
+            <a:avLst/>
+          </a:prstGeom>
+          <a:ln>
+            <a:solidFill>
+              <a:schemeClr val="tx1"/>
+            </a:solidFill>
+          </a:ln>
+        </p:spPr>
+        <p:style>
+          <a:lnRef idx="1">
+            <a:schemeClr val="accent1"/>
+          </a:lnRef>
+          <a:fillRef idx="0">
+            <a:schemeClr val="accent1"/>
+          </a:fillRef>
+          <a:effectRef idx="0">
+            <a:schemeClr val="accent1"/>
+          </a:effectRef>
+          <a:fontRef idx="minor">
+            <a:schemeClr val="tx1"/>
+          </a:fontRef>
+        </p:style>
+        <p:txBody>
+          <a:bodyPr rtlCol="0" anchor="ctr"/>
+          <a:lstStyle/>
+          <a:p>
+            <a:pPr algn="ctr"/>
+            <a:endParaRPr lang="en-US"/>
+          </a:p>
+        </p:txBody>
+      </p:sp>
+      <p:sp>
+        <p:nvSpPr>
+          <p:cNvPr id="160" name="TextBox 159"/>
+          <p:cNvSpPr txBox="1"/>
+          <p:nvPr/>
+        </p:nvSpPr>
+        <p:spPr>
+          <a:xfrm>
+            <a:off x="221903" y="3602073"/>
+            <a:ext cx="461665" cy="1607511"/>
+          </a:xfrm>
+          <a:prstGeom prst="rect">
+            <a:avLst/>
+          </a:prstGeom>
+          <a:noFill/>
+        </p:spPr>
+        <p:txBody>
+          <a:bodyPr vert="vert270" wrap="square" rtlCol="0">
+            <a:spAutoFit/>
+          </a:bodyPr>
+          <a:lstStyle/>
+          <a:p>
+            <a:r>
+              <a:rPr lang="en-US" dirty="0" smtClean="0"/>
+              <a:t>System testing</a:t>
+            </a:r>
+            <a:endParaRPr lang="en-US" dirty="0"/>
+          </a:p>
+        </p:txBody>
+      </p:sp>
+      <p:sp>
+        <p:nvSpPr>
+          <p:cNvPr id="163" name="Скругленный прямоугольник 162"/>
+          <p:cNvSpPr/>
+          <p:nvPr/>
+        </p:nvSpPr>
+        <p:spPr>
+          <a:xfrm>
+            <a:off x="7173538" y="4090184"/>
+            <a:ext cx="1152128" cy="428962"/>
+          </a:xfrm>
+          <a:prstGeom prst="roundRect">
+            <a:avLst/>
+          </a:prstGeom>
+          <a:solidFill>
+            <a:schemeClr val="accent6">
+              <a:lumMod val="75000"/>
+            </a:schemeClr>
+          </a:solidFill>
+        </p:spPr>
+        <p:style>
+          <a:lnRef idx="2">
+            <a:schemeClr val="accent1">
+              <a:shade val="50000"/>
+            </a:schemeClr>
+          </a:lnRef>
+          <a:fillRef idx="1">
+            <a:schemeClr val="accent1"/>
+          </a:fillRef>
+          <a:effectRef idx="0">
+            <a:schemeClr val="accent1"/>
+          </a:effectRef>
+          <a:fontRef idx="minor">
+            <a:schemeClr val="lt1"/>
+          </a:fontRef>
+        </p:style>
+        <p:txBody>
+          <a:bodyPr rtlCol="0" anchor="ctr"/>
+          <a:lstStyle/>
+          <a:p>
+            <a:pPr algn="ctr"/>
+            <a:r>
+              <a:rPr lang="en-US" sz="1400" dirty="0" smtClean="0"/>
+              <a:t>Acceptance</a:t>
+            </a:r>
+            <a:endParaRPr lang="en-US" sz="1400" dirty="0"/>
+          </a:p>
+        </p:txBody>
+      </p:sp>
+      <p:sp>
+        <p:nvSpPr>
+          <p:cNvPr id="164" name="Скругленный прямоугольник 163"/>
+          <p:cNvSpPr/>
+          <p:nvPr/>
+        </p:nvSpPr>
+        <p:spPr>
+          <a:xfrm>
+            <a:off x="7338405" y="3420250"/>
+            <a:ext cx="822394" cy="428962"/>
+          </a:xfrm>
+          <a:prstGeom prst="roundRect">
+            <a:avLst/>
+          </a:prstGeom>
+          <a:solidFill>
+            <a:schemeClr val="accent6">
+              <a:lumMod val="75000"/>
+            </a:schemeClr>
+          </a:solidFill>
+        </p:spPr>
+        <p:style>
+          <a:lnRef idx="2">
+            <a:schemeClr val="accent1">
+              <a:shade val="50000"/>
+            </a:schemeClr>
+          </a:lnRef>
+          <a:fillRef idx="1">
+            <a:schemeClr val="accent1"/>
+          </a:fillRef>
+          <a:effectRef idx="0">
+            <a:schemeClr val="accent1"/>
+          </a:effectRef>
+          <a:fontRef idx="minor">
+            <a:schemeClr val="lt1"/>
+          </a:fontRef>
+        </p:style>
+        <p:txBody>
+          <a:bodyPr rtlCol="0" anchor="ctr"/>
+          <a:lstStyle/>
+          <a:p>
+            <a:pPr algn="ctr"/>
+            <a:r>
+              <a:rPr lang="en-US" sz="1400" dirty="0" smtClean="0"/>
+              <a:t>Alfa</a:t>
+            </a:r>
+            <a:endParaRPr lang="en-US" sz="1400" dirty="0"/>
+          </a:p>
+        </p:txBody>
+      </p:sp>
+      <p:sp>
+        <p:nvSpPr>
+          <p:cNvPr id="165" name="Скругленный прямоугольник 164"/>
+          <p:cNvSpPr/>
+          <p:nvPr/>
+        </p:nvSpPr>
+        <p:spPr>
+          <a:xfrm>
+            <a:off x="7461570" y="2718319"/>
+            <a:ext cx="576064" cy="428962"/>
+          </a:xfrm>
+          <a:prstGeom prst="roundRect">
+            <a:avLst/>
+          </a:prstGeom>
+          <a:solidFill>
+            <a:schemeClr val="accent6">
+              <a:lumMod val="75000"/>
+            </a:schemeClr>
+          </a:solidFill>
+        </p:spPr>
+        <p:style>
+          <a:lnRef idx="2">
+            <a:schemeClr val="accent1">
+              <a:shade val="50000"/>
+            </a:schemeClr>
+          </a:lnRef>
+          <a:fillRef idx="1">
+            <a:schemeClr val="accent1"/>
+          </a:fillRef>
+          <a:effectRef idx="0">
+            <a:schemeClr val="accent1"/>
+          </a:effectRef>
+          <a:fontRef idx="minor">
+            <a:schemeClr val="lt1"/>
+          </a:fontRef>
+        </p:style>
+        <p:txBody>
+          <a:bodyPr rtlCol="0" anchor="ctr"/>
+          <a:lstStyle/>
+          <a:p>
+            <a:pPr algn="ctr"/>
+            <a:r>
+              <a:rPr lang="en-US" sz="1400" dirty="0" smtClean="0"/>
+              <a:t>Beta</a:t>
+            </a:r>
+            <a:endParaRPr lang="en-US" sz="1400" dirty="0"/>
+          </a:p>
+        </p:txBody>
+      </p:sp>
+      <p:sp>
+        <p:nvSpPr>
+          <p:cNvPr id="281" name="Скругленный прямоугольник 280"/>
+          <p:cNvSpPr/>
+          <p:nvPr/>
+        </p:nvSpPr>
+        <p:spPr>
+          <a:xfrm>
+            <a:off x="2746839" y="4212578"/>
+            <a:ext cx="1007534" cy="435590"/>
+          </a:xfrm>
+          <a:prstGeom prst="roundRect">
+            <a:avLst/>
+          </a:prstGeom>
+        </p:spPr>
+        <p:style>
+          <a:lnRef idx="2">
+            <a:schemeClr val="accent1">
+              <a:shade val="50000"/>
+            </a:schemeClr>
+          </a:lnRef>
+          <a:fillRef idx="1">
+            <a:schemeClr val="accent1"/>
+          </a:fillRef>
+          <a:effectRef idx="0">
+            <a:schemeClr val="accent1"/>
+          </a:effectRef>
+          <a:fontRef idx="minor">
+            <a:schemeClr val="lt1"/>
+          </a:fontRef>
+        </p:style>
+        <p:txBody>
+          <a:bodyPr rtlCol="0" anchor="ctr"/>
+          <a:lstStyle/>
+          <a:p>
+            <a:pPr algn="ctr"/>
+            <a:r>
+              <a:rPr lang="en-US" sz="1400" dirty="0" smtClean="0"/>
+              <a:t>New </a:t>
+            </a:r>
+            <a:r>
+              <a:rPr lang="en-US" sz="1400" dirty="0" err="1" smtClean="0"/>
+              <a:t>func</a:t>
+            </a:r>
+            <a:r>
+              <a:rPr lang="en-US" sz="1400" dirty="0" smtClean="0"/>
+              <a:t>.</a:t>
+            </a:r>
+            <a:endParaRPr lang="en-US" sz="1400" dirty="0"/>
+          </a:p>
+        </p:txBody>
+      </p:sp>
+      <p:cxnSp>
+        <p:nvCxnSpPr>
+          <p:cNvPr id="296" name="Прямая со стрелкой 295"/>
+          <p:cNvCxnSpPr>
+            <a:stCxn id="24" idx="2"/>
+            <a:endCxn id="281" idx="0"/>
+          </p:cNvCxnSpPr>
+          <p:nvPr/>
+        </p:nvCxnSpPr>
+        <p:spPr>
+          <a:xfrm>
+            <a:off x="2370374" y="3922763"/>
+            <a:ext cx="880232" cy="289815"/>
+          </a:xfrm>
+          <a:prstGeom prst="straightConnector1">
+            <a:avLst/>
+          </a:prstGeom>
+          <a:ln>
+            <a:tailEnd type="arrow"/>
+          </a:ln>
+        </p:spPr>
+        <p:style>
+          <a:lnRef idx="1">
+            <a:schemeClr val="accent1"/>
+          </a:lnRef>
+          <a:fillRef idx="0">
+            <a:schemeClr val="accent1"/>
+          </a:fillRef>
+          <a:effectRef idx="0">
+            <a:schemeClr val="accent1"/>
+          </a:effectRef>
+          <a:fontRef idx="minor">
+            <a:schemeClr val="tx1"/>
+          </a:fontRef>
+        </p:style>
+      </p:cxnSp>
+      <p:cxnSp>
+        <p:nvCxnSpPr>
+          <p:cNvPr id="298" name="Прямая со стрелкой 297"/>
+          <p:cNvCxnSpPr>
+            <a:stCxn id="23" idx="2"/>
+            <a:endCxn id="25" idx="0"/>
+          </p:cNvCxnSpPr>
+          <p:nvPr/>
+        </p:nvCxnSpPr>
+        <p:spPr>
+          <a:xfrm>
+            <a:off x="1531477" y="4665530"/>
+            <a:ext cx="639189" cy="211798"/>
+          </a:xfrm>
+          <a:prstGeom prst="straightConnector1">
+            <a:avLst/>
+          </a:prstGeom>
+          <a:ln>
+            <a:tailEnd type="arrow"/>
+          </a:ln>
+        </p:spPr>
+        <p:style>
+          <a:lnRef idx="1">
+            <a:schemeClr val="accent1"/>
+          </a:lnRef>
+          <a:fillRef idx="0">
+            <a:schemeClr val="accent1"/>
+          </a:fillRef>
+          <a:effectRef idx="0">
+            <a:schemeClr val="accent1"/>
+          </a:effectRef>
+          <a:fontRef idx="minor">
+            <a:schemeClr val="tx1"/>
+          </a:fontRef>
+        </p:style>
+      </p:cxnSp>
+      <p:cxnSp>
+        <p:nvCxnSpPr>
+          <p:cNvPr id="300" name="Прямая со стрелкой 299"/>
+          <p:cNvCxnSpPr>
+            <a:stCxn id="281" idx="2"/>
+            <a:endCxn id="25" idx="0"/>
+          </p:cNvCxnSpPr>
+          <p:nvPr/>
+        </p:nvCxnSpPr>
+        <p:spPr>
+          <a:xfrm flipH="1">
+            <a:off x="2170666" y="4648168"/>
+            <a:ext cx="1079940" cy="229160"/>
+          </a:xfrm>
+          <a:prstGeom prst="straightConnector1">
+            <a:avLst/>
+          </a:prstGeom>
+          <a:ln>
+            <a:tailEnd type="arrow"/>
+          </a:ln>
+        </p:spPr>
+        <p:style>
+          <a:lnRef idx="1">
+            <a:schemeClr val="accent1"/>
+          </a:lnRef>
+          <a:fillRef idx="0">
+            <a:schemeClr val="accent1"/>
+          </a:fillRef>
+          <a:effectRef idx="0">
+            <a:schemeClr val="accent1"/>
+          </a:effectRef>
+          <a:fontRef idx="minor">
+            <a:schemeClr val="tx1"/>
+          </a:fontRef>
+        </p:style>
+      </p:cxnSp>
+      <p:cxnSp>
+        <p:nvCxnSpPr>
+          <p:cNvPr id="310" name="Прямая со стрелкой 309"/>
+          <p:cNvCxnSpPr>
+            <a:stCxn id="21" idx="2"/>
+            <a:endCxn id="22" idx="0"/>
+          </p:cNvCxnSpPr>
+          <p:nvPr/>
+        </p:nvCxnSpPr>
+        <p:spPr>
+          <a:xfrm>
+            <a:off x="3519198" y="2947864"/>
+            <a:ext cx="1891372" cy="1929464"/>
+          </a:xfrm>
+          <a:prstGeom prst="straightConnector1">
+            <a:avLst/>
+          </a:prstGeom>
+          <a:ln>
+            <a:tailEnd type="arrow"/>
+          </a:ln>
+        </p:spPr>
+        <p:style>
+          <a:lnRef idx="1">
+            <a:schemeClr val="accent1"/>
+          </a:lnRef>
+          <a:fillRef idx="0">
+            <a:schemeClr val="accent1"/>
+          </a:fillRef>
+          <a:effectRef idx="0">
+            <a:schemeClr val="accent1"/>
+          </a:effectRef>
+          <a:fontRef idx="minor">
+            <a:schemeClr val="tx1"/>
+          </a:fontRef>
+        </p:style>
+      </p:cxnSp>
+      <p:cxnSp>
+        <p:nvCxnSpPr>
+          <p:cNvPr id="320" name="Скругленная соединительная линия 319"/>
+          <p:cNvCxnSpPr>
+            <a:stCxn id="25" idx="2"/>
+            <a:endCxn id="22" idx="0"/>
+          </p:cNvCxnSpPr>
+          <p:nvPr/>
+        </p:nvCxnSpPr>
+        <p:spPr>
+          <a:xfrm rot="5400000" flipH="1" flipV="1">
+            <a:off x="3610598" y="3437396"/>
+            <a:ext cx="360040" cy="3239904"/>
+          </a:xfrm>
+          <a:prstGeom prst="curvedConnector5">
+            <a:avLst>
+              <a:gd name="adj1" fmla="val -63493"/>
+              <a:gd name="adj2" fmla="val 35246"/>
+              <a:gd name="adj3" fmla="val 163493"/>
+            </a:avLst>
+          </a:prstGeom>
+          <a:ln>
+            <a:tailEnd type="arrow"/>
+          </a:ln>
+        </p:spPr>
+        <p:style>
+          <a:lnRef idx="1">
+            <a:schemeClr val="accent1"/>
+          </a:lnRef>
+          <a:fillRef idx="0">
+            <a:schemeClr val="accent1"/>
+          </a:fillRef>
+          <a:effectRef idx="0">
+            <a:schemeClr val="accent1"/>
+          </a:effectRef>
+          <a:fontRef idx="minor">
+            <a:schemeClr val="tx1"/>
+          </a:fontRef>
+        </p:style>
+      </p:cxnSp>
+      <p:cxnSp>
+        <p:nvCxnSpPr>
+          <p:cNvPr id="332" name="Соединительная линия уступом 331"/>
+          <p:cNvCxnSpPr>
+            <a:stCxn id="22" idx="3"/>
+            <a:endCxn id="163" idx="2"/>
+          </p:cNvCxnSpPr>
+          <p:nvPr/>
+        </p:nvCxnSpPr>
+        <p:spPr>
+          <a:xfrm flipV="1">
+            <a:off x="6980445" y="4519146"/>
+            <a:ext cx="769157" cy="1152877"/>
+          </a:xfrm>
+          <a:prstGeom prst="bentConnector2">
+            <a:avLst/>
+          </a:prstGeom>
+          <a:ln>
+            <a:tailEnd type="arrow"/>
+          </a:ln>
+        </p:spPr>
+        <p:style>
+          <a:lnRef idx="1">
+            <a:schemeClr val="accent1"/>
+          </a:lnRef>
+          <a:fillRef idx="0">
+            <a:schemeClr val="accent1"/>
+          </a:fillRef>
+          <a:effectRef idx="0">
+            <a:schemeClr val="accent1"/>
+          </a:effectRef>
+          <a:fontRef idx="minor">
+            <a:schemeClr val="tx1"/>
+          </a:fontRef>
+        </p:style>
+      </p:cxnSp>
+      <p:cxnSp>
+        <p:nvCxnSpPr>
+          <p:cNvPr id="336" name="Прямая со стрелкой 335"/>
+          <p:cNvCxnSpPr>
+            <a:stCxn id="163" idx="0"/>
+            <a:endCxn id="164" idx="2"/>
+          </p:cNvCxnSpPr>
+          <p:nvPr/>
+        </p:nvCxnSpPr>
+        <p:spPr>
+          <a:xfrm flipV="1">
+            <a:off x="7749602" y="3849212"/>
+            <a:ext cx="0" cy="240972"/>
+          </a:xfrm>
+          <a:prstGeom prst="straightConnector1">
+            <a:avLst/>
+          </a:prstGeom>
+          <a:ln>
+            <a:tailEnd type="arrow"/>
+          </a:ln>
+        </p:spPr>
+        <p:style>
+          <a:lnRef idx="1">
+            <a:schemeClr val="accent1"/>
+          </a:lnRef>
+          <a:fillRef idx="0">
+            <a:schemeClr val="accent1"/>
+          </a:fillRef>
+          <a:effectRef idx="0">
+            <a:schemeClr val="accent1"/>
+          </a:effectRef>
+          <a:fontRef idx="minor">
+            <a:schemeClr val="tx1"/>
+          </a:fontRef>
+        </p:style>
+      </p:cxnSp>
+      <p:cxnSp>
+        <p:nvCxnSpPr>
+          <p:cNvPr id="338" name="Прямая со стрелкой 337"/>
+          <p:cNvCxnSpPr>
+            <a:stCxn id="164" idx="0"/>
+            <a:endCxn id="165" idx="2"/>
+          </p:cNvCxnSpPr>
+          <p:nvPr/>
+        </p:nvCxnSpPr>
+        <p:spPr>
+          <a:xfrm flipV="1">
+            <a:off x="7749602" y="3147281"/>
+            <a:ext cx="0" cy="272969"/>
+          </a:xfrm>
+          <a:prstGeom prst="straightConnector1">
+            <a:avLst/>
+          </a:prstGeom>
+          <a:ln>
+            <a:tailEnd type="arrow"/>
+          </a:ln>
+        </p:spPr>
+        <p:style>
+          <a:lnRef idx="1">
+            <a:schemeClr val="accent1"/>
+          </a:lnRef>
+          <a:fillRef idx="0">
+            <a:schemeClr val="accent1"/>
+          </a:fillRef>
+          <a:effectRef idx="0">
+            <a:schemeClr val="accent1"/>
+          </a:effectRef>
+          <a:fontRef idx="minor">
+            <a:schemeClr val="tx1"/>
+          </a:fontRef>
+        </p:style>
+      </p:cxnSp>
+      <p:sp>
+        <p:nvSpPr>
+          <p:cNvPr id="344" name="Скругленный прямоугольник 343"/>
+          <p:cNvSpPr/>
+          <p:nvPr/>
+        </p:nvSpPr>
+        <p:spPr>
+          <a:xfrm>
+            <a:off x="291994" y="536030"/>
+            <a:ext cx="363402" cy="222894"/>
+          </a:xfrm>
+          <a:prstGeom prst="roundRect">
+            <a:avLst/>
+          </a:prstGeom>
+          <a:solidFill>
+            <a:schemeClr val="accent1"/>
+          </a:solidFill>
+        </p:spPr>
+        <p:style>
+          <a:lnRef idx="2">
+            <a:schemeClr val="accent1">
+              <a:shade val="50000"/>
+            </a:schemeClr>
+          </a:lnRef>
+          <a:fillRef idx="1">
+            <a:schemeClr val="accent1"/>
+          </a:fillRef>
+          <a:effectRef idx="0">
+            <a:schemeClr val="accent1"/>
+          </a:effectRef>
+          <a:fontRef idx="minor">
+            <a:schemeClr val="lt1"/>
+          </a:fontRef>
+        </p:style>
+        <p:txBody>
+          <a:bodyPr rtlCol="0" anchor="ctr"/>
+          <a:lstStyle/>
+          <a:p>
+            <a:pPr algn="ctr"/>
+            <a:endParaRPr lang="en-US" sz="1400" dirty="0"/>
+          </a:p>
+        </p:txBody>
+      </p:sp>
+      <p:sp>
+        <p:nvSpPr>
+          <p:cNvPr id="345" name="Овал 344"/>
+          <p:cNvSpPr/>
+          <p:nvPr/>
+        </p:nvSpPr>
+        <p:spPr>
+          <a:xfrm>
+            <a:off x="3029865" y="332656"/>
+            <a:ext cx="974008" cy="345124"/>
+          </a:xfrm>
+          <a:prstGeom prst="ellipse">
+            <a:avLst/>
+          </a:prstGeom>
+          <a:solidFill>
+            <a:schemeClr val="accent2">
+              <a:lumMod val="60000"/>
+              <a:lumOff val="40000"/>
+            </a:schemeClr>
+          </a:solidFill>
+        </p:spPr>
+        <p:style>
+          <a:lnRef idx="2">
+            <a:schemeClr val="accent1">
+              <a:shade val="50000"/>
+            </a:schemeClr>
+          </a:lnRef>
+          <a:fillRef idx="1">
+            <a:schemeClr val="accent1"/>
+          </a:fillRef>
+          <a:effectRef idx="0">
+            <a:schemeClr val="accent1"/>
+          </a:effectRef>
+          <a:fontRef idx="minor">
+            <a:schemeClr val="lt1"/>
+          </a:fontRef>
+        </p:style>
+        <p:txBody>
+          <a:bodyPr rtlCol="0" anchor="ctr"/>
+          <a:lstStyle/>
+          <a:p>
+            <a:pPr algn="ctr"/>
+            <a:r>
+              <a:rPr lang="en-US" sz="1400" dirty="0" smtClean="0"/>
+              <a:t>Start</a:t>
+            </a:r>
+            <a:endParaRPr lang="en-US" sz="1400" dirty="0"/>
+          </a:p>
+        </p:txBody>
+      </p:sp>
+      <p:sp>
+        <p:nvSpPr>
+          <p:cNvPr id="346" name="Овал 345"/>
+          <p:cNvSpPr/>
+          <p:nvPr/>
+        </p:nvSpPr>
+        <p:spPr>
+          <a:xfrm>
+            <a:off x="279914" y="246375"/>
+            <a:ext cx="363402" cy="172562"/>
+          </a:xfrm>
+          <a:prstGeom prst="ellipse">
+            <a:avLst/>
+          </a:prstGeom>
+          <a:solidFill>
+            <a:schemeClr val="accent2">
+              <a:lumMod val="60000"/>
+              <a:lumOff val="40000"/>
+            </a:schemeClr>
+          </a:solidFill>
+        </p:spPr>
+        <p:style>
+          <a:lnRef idx="2">
+            <a:schemeClr val="accent1">
+              <a:shade val="50000"/>
+            </a:schemeClr>
+          </a:lnRef>
+          <a:fillRef idx="1">
+            <a:schemeClr val="accent1"/>
+          </a:fillRef>
+          <a:effectRef idx="0">
+            <a:schemeClr val="accent1"/>
+          </a:effectRef>
+          <a:fontRef idx="minor">
+            <a:schemeClr val="lt1"/>
+          </a:fontRef>
+        </p:style>
+        <p:txBody>
+          <a:bodyPr rtlCol="0" anchor="ctr"/>
+          <a:lstStyle/>
+          <a:p>
+            <a:pPr algn="ctr"/>
+            <a:endParaRPr lang="en-US"/>
+          </a:p>
+        </p:txBody>
+      </p:sp>
+      <p:sp>
+        <p:nvSpPr>
+          <p:cNvPr id="348" name="Скругленный прямоугольник 347"/>
+          <p:cNvSpPr/>
+          <p:nvPr/>
+        </p:nvSpPr>
+        <p:spPr>
+          <a:xfrm>
+            <a:off x="285165" y="914856"/>
+            <a:ext cx="363402" cy="222894"/>
+          </a:xfrm>
+          <a:prstGeom prst="roundRect">
+            <a:avLst/>
+          </a:prstGeom>
+          <a:solidFill>
+            <a:srgbClr val="00B050"/>
+          </a:solidFill>
+        </p:spPr>
+        <p:style>
+          <a:lnRef idx="2">
+            <a:schemeClr val="accent1">
+              <a:shade val="50000"/>
+            </a:schemeClr>
+          </a:lnRef>
+          <a:fillRef idx="1">
+            <a:schemeClr val="accent1"/>
+          </a:fillRef>
+          <a:effectRef idx="0">
+            <a:schemeClr val="accent1"/>
+          </a:effectRef>
+          <a:fontRef idx="minor">
+            <a:schemeClr val="lt1"/>
+          </a:fontRef>
+        </p:style>
+        <p:txBody>
+          <a:bodyPr rtlCol="0" anchor="ctr"/>
+          <a:lstStyle/>
+          <a:p>
+            <a:pPr algn="ctr"/>
+            <a:endParaRPr lang="en-US" sz="1400" dirty="0"/>
+          </a:p>
+        </p:txBody>
+      </p:sp>
+      <p:sp>
+        <p:nvSpPr>
+          <p:cNvPr id="349" name="Скругленный прямоугольник 348"/>
+          <p:cNvSpPr/>
+          <p:nvPr/>
+        </p:nvSpPr>
+        <p:spPr>
+          <a:xfrm flipV="1">
+            <a:off x="309003" y="1261692"/>
+            <a:ext cx="329967" cy="240043"/>
+          </a:xfrm>
+          <a:prstGeom prst="roundRect">
+            <a:avLst/>
+          </a:prstGeom>
+          <a:solidFill>
+            <a:schemeClr val="accent6">
+              <a:lumMod val="75000"/>
+            </a:schemeClr>
+          </a:solidFill>
+        </p:spPr>
+        <p:style>
+          <a:lnRef idx="2">
+            <a:schemeClr val="accent1">
+              <a:shade val="50000"/>
+            </a:schemeClr>
+          </a:lnRef>
+          <a:fillRef idx="1">
+            <a:schemeClr val="accent1"/>
+          </a:fillRef>
+          <a:effectRef idx="0">
+            <a:schemeClr val="accent1"/>
+          </a:effectRef>
+          <a:fontRef idx="minor">
+            <a:schemeClr val="lt1"/>
+          </a:fontRef>
+        </p:style>
+        <p:txBody>
+          <a:bodyPr rtlCol="0" anchor="ctr"/>
+          <a:lstStyle/>
+          <a:p>
+            <a:pPr algn="ctr"/>
+            <a:endParaRPr lang="en-US" sz="1400" dirty="0"/>
+          </a:p>
+        </p:txBody>
+      </p:sp>
+      <p:sp>
+        <p:nvSpPr>
+          <p:cNvPr id="350" name="TextBox 349"/>
+          <p:cNvSpPr txBox="1"/>
+          <p:nvPr/>
+        </p:nvSpPr>
+        <p:spPr>
+          <a:xfrm>
+            <a:off x="690335" y="194156"/>
+            <a:ext cx="1936906" cy="276999"/>
+          </a:xfrm>
+          <a:prstGeom prst="rect">
+            <a:avLst/>
+          </a:prstGeom>
+          <a:noFill/>
+        </p:spPr>
+        <p:txBody>
+          <a:bodyPr wrap="square" rtlCol="0">
+            <a:spAutoFit/>
+          </a:bodyPr>
+          <a:lstStyle/>
+          <a:p>
+            <a:r>
+              <a:rPr lang="ru-RU" sz="1200" dirty="0" smtClean="0"/>
+              <a:t>- Не вид тестирования</a:t>
+            </a:r>
+            <a:endParaRPr lang="en-US" sz="1200" dirty="0"/>
+          </a:p>
+        </p:txBody>
+      </p:sp>
+      <p:sp>
+        <p:nvSpPr>
+          <p:cNvPr id="355" name="TextBox 354"/>
+          <p:cNvSpPr txBox="1"/>
+          <p:nvPr/>
+        </p:nvSpPr>
+        <p:spPr>
+          <a:xfrm>
+            <a:off x="711934" y="508977"/>
+            <a:ext cx="1936906" cy="276999"/>
+          </a:xfrm>
+          <a:prstGeom prst="rect">
+            <a:avLst/>
+          </a:prstGeom>
+          <a:noFill/>
+        </p:spPr>
+        <p:txBody>
+          <a:bodyPr wrap="square" rtlCol="0">
+            <a:spAutoFit/>
+          </a:bodyPr>
+          <a:lstStyle/>
+          <a:p>
+            <a:r>
+              <a:rPr lang="ru-RU" sz="1200" dirty="0" smtClean="0"/>
+              <a:t>- Функциональное</a:t>
+            </a:r>
+            <a:endParaRPr lang="en-US" sz="1200" dirty="0"/>
+          </a:p>
+        </p:txBody>
+      </p:sp>
+      <p:sp>
+        <p:nvSpPr>
+          <p:cNvPr id="357" name="TextBox 356"/>
+          <p:cNvSpPr txBox="1"/>
+          <p:nvPr/>
+        </p:nvSpPr>
+        <p:spPr>
+          <a:xfrm>
+            <a:off x="720917" y="899320"/>
+            <a:ext cx="1936906" cy="276999"/>
+          </a:xfrm>
+          <a:prstGeom prst="rect">
+            <a:avLst/>
+          </a:prstGeom>
+          <a:noFill/>
+        </p:spPr>
+        <p:txBody>
+          <a:bodyPr wrap="square" rtlCol="0">
+            <a:spAutoFit/>
+          </a:bodyPr>
+          <a:lstStyle/>
+          <a:p>
+            <a:r>
+              <a:rPr lang="ru-RU" sz="1200" dirty="0" smtClean="0"/>
+              <a:t>- Не функциональное</a:t>
+            </a:r>
+            <a:endParaRPr lang="en-US" sz="1200" dirty="0"/>
+          </a:p>
+        </p:txBody>
+      </p:sp>
+      <p:sp>
+        <p:nvSpPr>
+          <p:cNvPr id="358" name="TextBox 357"/>
+          <p:cNvSpPr txBox="1"/>
+          <p:nvPr/>
+        </p:nvSpPr>
+        <p:spPr>
+          <a:xfrm>
+            <a:off x="752269" y="1253937"/>
+            <a:ext cx="1823385" cy="276999"/>
+          </a:xfrm>
+          <a:prstGeom prst="rect">
+            <a:avLst/>
+          </a:prstGeom>
+          <a:noFill/>
+        </p:spPr>
+        <p:txBody>
+          <a:bodyPr wrap="square" rtlCol="0">
+            <a:spAutoFit/>
+          </a:bodyPr>
+          <a:lstStyle/>
+          <a:p>
+            <a:r>
+              <a:rPr lang="ru-RU" sz="1200" dirty="0" smtClean="0"/>
+              <a:t>- Приемочное</a:t>
+            </a:r>
+            <a:endParaRPr lang="en-US" sz="1200" dirty="0"/>
+          </a:p>
+        </p:txBody>
+      </p:sp>
+    </p:spTree>
+    <p:extLst>
+      <p:ext uri="{BB962C8B-B14F-4D97-AF65-F5344CB8AC3E}">
+        <p14:creationId xmlns:p14="http://schemas.microsoft.com/office/powerpoint/2010/main" val="565865233"/>
+      </p:ext>
+    </p:extLst>
+  </p:cSld>
+  <p:clrMapOvr>
+    <a:masterClrMapping/>
+  </p:clrMapOvr>
+  <p:timing>
+    <p:tnLst>
+      <p:par>
+        <p:cTn id="1" dur="indefinite" restart="never" nodeType="tmRoot"/>
+      </p:par>
+    </p:tnLst>
+  </p:timing>
+</p:sld>
+</file>
+
+<file path=ppt/slides/slide11.xml><?xml version="1.0" encoding="utf-8"?>
+<p:sld xmlns:a="http://schemas.openxmlformats.org/drawingml/2006/main" xmlns:r="http://schemas.openxmlformats.org/officeDocument/2006/relationships" xmlns:p="http://schemas.openxmlformats.org/presentationml/2006/main">
+  <p:cSld>
+    <p:spTree>
+      <p:nvGrpSpPr>
+        <p:cNvPr id="1" name=""/>
+        <p:cNvGrpSpPr/>
+        <p:nvPr/>
+      </p:nvGrpSpPr>
+      <p:grpSpPr>
+        <a:xfrm>
+          <a:off x="0" y="0"/>
+          <a:ext cx="0" cy="0"/>
+          <a:chOff x="0" y="0"/>
+          <a:chExt cx="0" cy="0"/>
+        </a:xfrm>
+      </p:grpSpPr>
+      <p:sp>
+        <p:nvSpPr>
           <p:cNvPr id="4" name="TextBox 3"/>
           <p:cNvSpPr txBox="1"/>
           <p:nvPr/>
@@ -4430,7 +6023,7 @@
 </p:sld>
 </file>
 
-<file path=ppt/slides/slide11.xml><?xml version="1.0" encoding="utf-8"?>
+<file path=ppt/slides/slide12.xml><?xml version="1.0" encoding="utf-8"?>
 <p:sld xmlns:a="http://schemas.openxmlformats.org/drawingml/2006/main" xmlns:r="http://schemas.openxmlformats.org/officeDocument/2006/relationships" xmlns:p="http://schemas.openxmlformats.org/presentationml/2006/main">
   <p:cSld>
     <p:spTree>
@@ -5137,7 +6730,7 @@
 </p:sld>
 </file>
 
-<file path=ppt/slides/slide12.xml><?xml version="1.0" encoding="utf-8"?>
+<file path=ppt/slides/slide13.xml><?xml version="1.0" encoding="utf-8"?>
 <p:sld xmlns:a="http://schemas.openxmlformats.org/drawingml/2006/main" xmlns:r="http://schemas.openxmlformats.org/officeDocument/2006/relationships" xmlns:p="http://schemas.openxmlformats.org/presentationml/2006/main">
   <p:cSld>
     <p:spTree>
@@ -5411,7 +7004,7 @@
 </p:sld>
 </file>
 
-<file path=ppt/slides/slide13.xml><?xml version="1.0" encoding="utf-8"?>
+<file path=ppt/slides/slide14.xml><?xml version="1.0" encoding="utf-8"?>
 <p:sld xmlns:a="http://schemas.openxmlformats.org/drawingml/2006/main" xmlns:r="http://schemas.openxmlformats.org/officeDocument/2006/relationships" xmlns:p="http://schemas.openxmlformats.org/presentationml/2006/main">
   <p:cSld>
     <p:spTree>
@@ -6018,7 +7611,7 @@
 </p:sld>
 </file>
 
-<file path=ppt/slides/slide14.xml><?xml version="1.0" encoding="utf-8"?>
+<file path=ppt/slides/slide15.xml><?xml version="1.0" encoding="utf-8"?>
 <p:sld xmlns:a="http://schemas.openxmlformats.org/drawingml/2006/main" xmlns:r="http://schemas.openxmlformats.org/officeDocument/2006/relationships" xmlns:p="http://schemas.openxmlformats.org/presentationml/2006/main">
   <p:cSld>
     <p:spTree>
@@ -6495,7 +8088,7 @@
 </p:sld>
 </file>
 
-<file path=ppt/slides/slide15.xml><?xml version="1.0" encoding="utf-8"?>
+<file path=ppt/slides/slide16.xml><?xml version="1.0" encoding="utf-8"?>
 <p:sld xmlns:a="http://schemas.openxmlformats.org/drawingml/2006/main" xmlns:r="http://schemas.openxmlformats.org/officeDocument/2006/relationships" xmlns:p="http://schemas.openxmlformats.org/presentationml/2006/main">
   <p:cSld>
     <p:spTree>
@@ -6766,7 +8359,7 @@
 </p:sld>
 </file>
 
-<file path=ppt/slides/slide16.xml><?xml version="1.0" encoding="utf-8"?>
+<file path=ppt/slides/slide17.xml><?xml version="1.0" encoding="utf-8"?>
 <p:sld xmlns:a="http://schemas.openxmlformats.org/drawingml/2006/main" xmlns:r="http://schemas.openxmlformats.org/officeDocument/2006/relationships" xmlns:p="http://schemas.openxmlformats.org/presentationml/2006/main">
   <p:cSld>
     <p:spTree>
@@ -7761,7 +9354,7 @@
 </p:sld>
 </file>
 
-<file path=ppt/slides/slide17.xml><?xml version="1.0" encoding="utf-8"?>
+<file path=ppt/slides/slide18.xml><?xml version="1.0" encoding="utf-8"?>
 <p:sld xmlns:a="http://schemas.openxmlformats.org/drawingml/2006/main" xmlns:r="http://schemas.openxmlformats.org/officeDocument/2006/relationships" xmlns:p="http://schemas.openxmlformats.org/presentationml/2006/main">
   <p:cSld>
     <p:spTree>
@@ -7869,7 +9462,7 @@
         </p:nvSpPr>
         <p:spPr>
           <a:xfrm>
-            <a:off x="1066799" y="1193248"/>
+            <a:off x="1138902" y="1088142"/>
             <a:ext cx="2571794" cy="430887"/>
           </a:xfrm>
           <a:prstGeom prst="rect">
@@ -7905,7 +9498,7 @@
         </p:nvSpPr>
         <p:spPr>
           <a:xfrm>
-            <a:off x="1066799" y="1636959"/>
+            <a:off x="1138902" y="1503034"/>
             <a:ext cx="3022027" cy="430887"/>
           </a:xfrm>
           <a:prstGeom prst="rect">
@@ -7941,8 +9534,8 @@
         </p:nvSpPr>
         <p:spPr>
           <a:xfrm>
-            <a:off x="1371600" y="1916832"/>
-            <a:ext cx="2123084" cy="769441"/>
+            <a:off x="1394453" y="1844824"/>
+            <a:ext cx="3056384" cy="1107996"/>
           </a:xfrm>
           <a:prstGeom prst="rect">
             <a:avLst/>
@@ -7963,8 +9556,8 @@
               <a:buChar char="•"/>
             </a:pPr>
             <a:r>
-              <a:rPr lang="en-US" sz="2200" dirty="0"/>
-              <a:t>Load</a:t>
+              <a:rPr lang="en-US" sz="2200" dirty="0" smtClean="0"/>
+              <a:t>Performance</a:t>
             </a:r>
           </a:p>
           <a:p>
@@ -7978,6 +9571,21 @@
             </a:pPr>
             <a:r>
               <a:rPr lang="en-US" sz="2200" dirty="0" smtClean="0"/>
+              <a:t>Load</a:t>
+            </a:r>
+            <a:endParaRPr lang="en-US" sz="2200" dirty="0"/>
+          </a:p>
+          <a:p>
+            <a:pPr marL="800100" lvl="1" indent="-342900">
+              <a:buClr>
+                <a:srgbClr val="76A9D4"/>
+              </a:buClr>
+              <a:buSzPct val="90000"/>
+              <a:buFont typeface="Calibri" pitchFamily="34" charset="0"/>
+              <a:buChar char="•"/>
+            </a:pPr>
+            <a:r>
+              <a:rPr lang="en-US" sz="2200" dirty="0" smtClean="0"/>
               <a:t>Stress</a:t>
             </a:r>
             <a:endParaRPr lang="en-US" sz="2200" dirty="0"/>
@@ -7992,7 +9600,7 @@
         </p:nvSpPr>
         <p:spPr>
           <a:xfrm>
-            <a:off x="1066799" y="2755032"/>
+            <a:off x="1067975" y="2952820"/>
             <a:ext cx="2363404" cy="430887"/>
           </a:xfrm>
           <a:prstGeom prst="rect">
@@ -8068,7 +9676,7 @@
         </p:nvSpPr>
         <p:spPr>
           <a:xfrm>
-            <a:off x="1066800" y="4140926"/>
+            <a:off x="1066800" y="4119316"/>
             <a:ext cx="2296078" cy="430887"/>
           </a:xfrm>
           <a:prstGeom prst="rect">
@@ -8926,7 +10534,7 @@
 </p:sld>
 </file>
 
-<file path=ppt/slides/slide18.xml><?xml version="1.0" encoding="utf-8"?>
+<file path=ppt/slides/slide19.xml><?xml version="1.0" encoding="utf-8"?>
 <p:sld xmlns:a="http://schemas.openxmlformats.org/drawingml/2006/main" xmlns:r="http://schemas.openxmlformats.org/officeDocument/2006/relationships" xmlns:p="http://schemas.openxmlformats.org/presentationml/2006/main">
   <p:cSld>
     <p:spTree>
@@ -9454,7 +11062,318 @@
 </p:sld>
 </file>
 
-<file path=ppt/slides/slide19.xml><?xml version="1.0" encoding="utf-8"?>
+<file path=ppt/slides/slide2.xml><?xml version="1.0" encoding="utf-8"?>
+<p:sld xmlns:a="http://schemas.openxmlformats.org/drawingml/2006/main" xmlns:r="http://schemas.openxmlformats.org/officeDocument/2006/relationships" xmlns:p="http://schemas.openxmlformats.org/presentationml/2006/main">
+  <p:cSld>
+    <p:spTree>
+      <p:nvGrpSpPr>
+        <p:cNvPr id="1" name=""/>
+        <p:cNvGrpSpPr/>
+        <p:nvPr/>
+      </p:nvGrpSpPr>
+      <p:grpSpPr>
+        <a:xfrm>
+          <a:off x="0" y="0"/>
+          <a:ext cx="0" cy="0"/>
+          <a:chOff x="0" y="0"/>
+          <a:chExt cx="0" cy="0"/>
+        </a:xfrm>
+      </p:grpSpPr>
+      <p:sp>
+        <p:nvSpPr>
+          <p:cNvPr id="3" name="TextBox 2"/>
+          <p:cNvSpPr txBox="1"/>
+          <p:nvPr/>
+        </p:nvSpPr>
+        <p:spPr>
+          <a:xfrm>
+            <a:off x="611560" y="332656"/>
+            <a:ext cx="1561133" cy="630942"/>
+          </a:xfrm>
+          <a:prstGeom prst="rect">
+            <a:avLst/>
+          </a:prstGeom>
+          <a:noFill/>
+        </p:spPr>
+        <p:txBody>
+          <a:bodyPr wrap="none" rtlCol="0">
+            <a:spAutoFit/>
+          </a:bodyPr>
+          <a:lstStyle/>
+          <a:p>
+            <a:r>
+              <a:rPr lang="en-US" sz="3500" dirty="0" smtClean="0">
+                <a:solidFill>
+                  <a:schemeClr val="tx1">
+                    <a:lumMod val="65000"/>
+                    <a:lumOff val="35000"/>
+                  </a:schemeClr>
+                </a:solidFill>
+                <a:effectLst>
+                  <a:outerShdw blurRad="38100" dist="38100" dir="2700000" algn="tl">
+                    <a:srgbClr val="000000">
+                      <a:alpha val="43137"/>
+                    </a:srgbClr>
+                  </a:outerShdw>
+                </a:effectLst>
+              </a:rPr>
+              <a:t>Agenda</a:t>
+            </a:r>
+            <a:endParaRPr lang="en-US" sz="3500" dirty="0">
+              <a:solidFill>
+                <a:schemeClr val="tx1">
+                  <a:lumMod val="65000"/>
+                  <a:lumOff val="35000"/>
+                </a:schemeClr>
+              </a:solidFill>
+              <a:effectLst>
+                <a:outerShdw blurRad="38100" dist="38100" dir="2700000" algn="tl">
+                  <a:srgbClr val="000000">
+                    <a:alpha val="43137"/>
+                  </a:srgbClr>
+                </a:outerShdw>
+              </a:effectLst>
+            </a:endParaRPr>
+          </a:p>
+        </p:txBody>
+      </p:sp>
+      <p:sp>
+        <p:nvSpPr>
+          <p:cNvPr id="5" name="Rectangle 4"/>
+          <p:cNvSpPr/>
+          <p:nvPr/>
+        </p:nvSpPr>
+        <p:spPr>
+          <a:xfrm>
+            <a:off x="914400" y="1340768"/>
+            <a:ext cx="3802901" cy="430887"/>
+          </a:xfrm>
+          <a:prstGeom prst="rect">
+            <a:avLst/>
+          </a:prstGeom>
+        </p:spPr>
+        <p:txBody>
+          <a:bodyPr wrap="none">
+            <a:spAutoFit/>
+          </a:bodyPr>
+          <a:lstStyle/>
+          <a:p>
+            <a:r>
+              <a:rPr lang="en-US" sz="2200" dirty="0" smtClean="0">
+                <a:solidFill>
+                  <a:schemeClr val="tx1">
+                    <a:lumMod val="75000"/>
+                    <a:lumOff val="25000"/>
+                  </a:schemeClr>
+                </a:solidFill>
+              </a:rPr>
+              <a:t>1. </a:t>
+            </a:r>
+            <a:r>
+              <a:rPr lang="ru-RU" sz="2200" dirty="0" smtClean="0">
+                <a:solidFill>
+                  <a:schemeClr val="tx1">
+                    <a:lumMod val="75000"/>
+                    <a:lumOff val="25000"/>
+                  </a:schemeClr>
+                </a:solidFill>
+              </a:rPr>
+              <a:t>Группы видов тестирования</a:t>
+            </a:r>
+            <a:endParaRPr lang="en-US" sz="2200" dirty="0">
+              <a:solidFill>
+                <a:schemeClr val="tx1">
+                  <a:lumMod val="75000"/>
+                  <a:lumOff val="25000"/>
+                </a:schemeClr>
+              </a:solidFill>
+            </a:endParaRPr>
+          </a:p>
+        </p:txBody>
+      </p:sp>
+      <p:sp>
+        <p:nvSpPr>
+          <p:cNvPr id="4" name="Rectangle 3"/>
+          <p:cNvSpPr/>
+          <p:nvPr/>
+        </p:nvSpPr>
+        <p:spPr>
+          <a:xfrm>
+            <a:off x="899592" y="1917993"/>
+            <a:ext cx="5022016" cy="430887"/>
+          </a:xfrm>
+          <a:prstGeom prst="rect">
+            <a:avLst/>
+          </a:prstGeom>
+        </p:spPr>
+        <p:txBody>
+          <a:bodyPr wrap="none">
+            <a:spAutoFit/>
+          </a:bodyPr>
+          <a:lstStyle/>
+          <a:p>
+            <a:r>
+              <a:rPr lang="en-US" sz="2200" dirty="0" smtClean="0">
+                <a:solidFill>
+                  <a:schemeClr val="tx1">
+                    <a:lumMod val="75000"/>
+                    <a:lumOff val="25000"/>
+                  </a:schemeClr>
+                </a:solidFill>
+              </a:rPr>
+              <a:t>2. </a:t>
+            </a:r>
+            <a:r>
+              <a:rPr lang="ru-RU" sz="2200" dirty="0" smtClean="0">
+                <a:solidFill>
+                  <a:schemeClr val="tx1">
+                    <a:lumMod val="75000"/>
+                    <a:lumOff val="25000"/>
+                  </a:schemeClr>
+                </a:solidFill>
+              </a:rPr>
+              <a:t>Описание каждого типа тестирования</a:t>
+            </a:r>
+            <a:endParaRPr lang="en-US" sz="2200" dirty="0">
+              <a:solidFill>
+                <a:schemeClr val="tx1">
+                  <a:lumMod val="75000"/>
+                  <a:lumOff val="25000"/>
+                </a:schemeClr>
+              </a:solidFill>
+            </a:endParaRPr>
+          </a:p>
+        </p:txBody>
+      </p:sp>
+      <p:sp>
+        <p:nvSpPr>
+          <p:cNvPr id="6" name="Rectangle 5"/>
+          <p:cNvSpPr/>
+          <p:nvPr/>
+        </p:nvSpPr>
+        <p:spPr>
+          <a:xfrm>
+            <a:off x="914400" y="2422048"/>
+            <a:ext cx="7883890" cy="430887"/>
+          </a:xfrm>
+          <a:prstGeom prst="rect">
+            <a:avLst/>
+          </a:prstGeom>
+        </p:spPr>
+        <p:txBody>
+          <a:bodyPr wrap="none">
+            <a:spAutoFit/>
+          </a:bodyPr>
+          <a:lstStyle/>
+          <a:p>
+            <a:r>
+              <a:rPr lang="en-US" sz="2200" dirty="0" smtClean="0">
+                <a:solidFill>
+                  <a:schemeClr val="tx1">
+                    <a:lumMod val="75000"/>
+                    <a:lumOff val="25000"/>
+                  </a:schemeClr>
+                </a:solidFill>
+              </a:rPr>
+              <a:t>3. </a:t>
+            </a:r>
+            <a:r>
+              <a:rPr lang="ru-RU" sz="2200" dirty="0" smtClean="0">
+                <a:solidFill>
+                  <a:schemeClr val="tx1">
+                    <a:lumMod val="75000"/>
+                    <a:lumOff val="25000"/>
+                  </a:schemeClr>
+                </a:solidFill>
+              </a:rPr>
+              <a:t>Преимущества и недостатки использования различных видов</a:t>
+            </a:r>
+            <a:endParaRPr lang="en-US" sz="2200" dirty="0">
+              <a:solidFill>
+                <a:schemeClr val="tx1">
+                  <a:lumMod val="75000"/>
+                  <a:lumOff val="25000"/>
+                </a:schemeClr>
+              </a:solidFill>
+            </a:endParaRPr>
+          </a:p>
+        </p:txBody>
+      </p:sp>
+      <p:sp>
+        <p:nvSpPr>
+          <p:cNvPr id="7" name="Rectangle 6"/>
+          <p:cNvSpPr/>
+          <p:nvPr/>
+        </p:nvSpPr>
+        <p:spPr>
+          <a:xfrm>
+            <a:off x="899592" y="2931457"/>
+            <a:ext cx="7632848" cy="430887"/>
+          </a:xfrm>
+          <a:prstGeom prst="rect">
+            <a:avLst/>
+          </a:prstGeom>
+        </p:spPr>
+        <p:txBody>
+          <a:bodyPr wrap="square">
+            <a:spAutoFit/>
+          </a:bodyPr>
+          <a:lstStyle/>
+          <a:p>
+            <a:r>
+              <a:rPr lang="en-US" sz="2200" dirty="0" smtClean="0">
+                <a:solidFill>
+                  <a:schemeClr val="tx1">
+                    <a:lumMod val="75000"/>
+                    <a:lumOff val="25000"/>
+                  </a:schemeClr>
+                </a:solidFill>
+              </a:rPr>
+              <a:t>4. </a:t>
+            </a:r>
+            <a:r>
+              <a:rPr lang="ru-RU" sz="2200" dirty="0" smtClean="0">
+                <a:solidFill>
+                  <a:schemeClr val="tx1">
+                    <a:lumMod val="75000"/>
+                    <a:lumOff val="25000"/>
+                  </a:schemeClr>
+                </a:solidFill>
+              </a:rPr>
+              <a:t>Примеры различных видов тестирования</a:t>
+            </a:r>
+            <a:endParaRPr lang="en-US" sz="2200" dirty="0">
+              <a:solidFill>
+                <a:schemeClr val="tx1">
+                  <a:lumMod val="75000"/>
+                  <a:lumOff val="25000"/>
+                </a:schemeClr>
+              </a:solidFill>
+            </a:endParaRPr>
+          </a:p>
+        </p:txBody>
+      </p:sp>
+    </p:spTree>
+    <p:extLst>
+      <p:ext uri="{BB962C8B-B14F-4D97-AF65-F5344CB8AC3E}">
+        <p14:creationId xmlns:p14="http://schemas.microsoft.com/office/powerpoint/2010/main" val="9039911"/>
+      </p:ext>
+    </p:extLst>
+  </p:cSld>
+  <p:clrMapOvr>
+    <a:masterClrMapping/>
+  </p:clrMapOvr>
+  <p:timing>
+    <p:tnLst>
+      <p:par>
+        <p:cTn id="1" dur="indefinite" restart="never" nodeType="tmRoot"/>
+      </p:par>
+    </p:tnLst>
+  </p:timing>
+</p:sld>
+</file>
+
+<file path=ppt/slides/slide20.xml><?xml version="1.0" encoding="utf-8"?>
 <p:sld xmlns:a="http://schemas.openxmlformats.org/drawingml/2006/main" xmlns:r="http://schemas.openxmlformats.org/officeDocument/2006/relationships" xmlns:p="http://schemas.openxmlformats.org/presentationml/2006/main">
   <p:cSld>
     <p:spTree>
@@ -9870,318 +11789,7 @@
 </p:sld>
 </file>
 
-<file path=ppt/slides/slide2.xml><?xml version="1.0" encoding="utf-8"?>
-<p:sld xmlns:a="http://schemas.openxmlformats.org/drawingml/2006/main" xmlns:r="http://schemas.openxmlformats.org/officeDocument/2006/relationships" xmlns:p="http://schemas.openxmlformats.org/presentationml/2006/main">
-  <p:cSld>
-    <p:spTree>
-      <p:nvGrpSpPr>
-        <p:cNvPr id="1" name=""/>
-        <p:cNvGrpSpPr/>
-        <p:nvPr/>
-      </p:nvGrpSpPr>
-      <p:grpSpPr>
-        <a:xfrm>
-          <a:off x="0" y="0"/>
-          <a:ext cx="0" cy="0"/>
-          <a:chOff x="0" y="0"/>
-          <a:chExt cx="0" cy="0"/>
-        </a:xfrm>
-      </p:grpSpPr>
-      <p:sp>
-        <p:nvSpPr>
-          <p:cNvPr id="3" name="TextBox 2"/>
-          <p:cNvSpPr txBox="1"/>
-          <p:nvPr/>
-        </p:nvSpPr>
-        <p:spPr>
-          <a:xfrm>
-            <a:off x="611560" y="332656"/>
-            <a:ext cx="1561133" cy="630942"/>
-          </a:xfrm>
-          <a:prstGeom prst="rect">
-            <a:avLst/>
-          </a:prstGeom>
-          <a:noFill/>
-        </p:spPr>
-        <p:txBody>
-          <a:bodyPr wrap="none" rtlCol="0">
-            <a:spAutoFit/>
-          </a:bodyPr>
-          <a:lstStyle/>
-          <a:p>
-            <a:r>
-              <a:rPr lang="en-US" sz="3500" dirty="0" smtClean="0">
-                <a:solidFill>
-                  <a:schemeClr val="tx1">
-                    <a:lumMod val="65000"/>
-                    <a:lumOff val="35000"/>
-                  </a:schemeClr>
-                </a:solidFill>
-                <a:effectLst>
-                  <a:outerShdw blurRad="38100" dist="38100" dir="2700000" algn="tl">
-                    <a:srgbClr val="000000">
-                      <a:alpha val="43137"/>
-                    </a:srgbClr>
-                  </a:outerShdw>
-                </a:effectLst>
-              </a:rPr>
-              <a:t>Agenda</a:t>
-            </a:r>
-            <a:endParaRPr lang="en-US" sz="3500" dirty="0">
-              <a:solidFill>
-                <a:schemeClr val="tx1">
-                  <a:lumMod val="65000"/>
-                  <a:lumOff val="35000"/>
-                </a:schemeClr>
-              </a:solidFill>
-              <a:effectLst>
-                <a:outerShdw blurRad="38100" dist="38100" dir="2700000" algn="tl">
-                  <a:srgbClr val="000000">
-                    <a:alpha val="43137"/>
-                  </a:srgbClr>
-                </a:outerShdw>
-              </a:effectLst>
-            </a:endParaRPr>
-          </a:p>
-        </p:txBody>
-      </p:sp>
-      <p:sp>
-        <p:nvSpPr>
-          <p:cNvPr id="5" name="Rectangle 4"/>
-          <p:cNvSpPr/>
-          <p:nvPr/>
-        </p:nvSpPr>
-        <p:spPr>
-          <a:xfrm>
-            <a:off x="914400" y="1340768"/>
-            <a:ext cx="3802901" cy="430887"/>
-          </a:xfrm>
-          <a:prstGeom prst="rect">
-            <a:avLst/>
-          </a:prstGeom>
-        </p:spPr>
-        <p:txBody>
-          <a:bodyPr wrap="none">
-            <a:spAutoFit/>
-          </a:bodyPr>
-          <a:lstStyle/>
-          <a:p>
-            <a:r>
-              <a:rPr lang="en-US" sz="2200" dirty="0" smtClean="0">
-                <a:solidFill>
-                  <a:schemeClr val="tx1">
-                    <a:lumMod val="75000"/>
-                    <a:lumOff val="25000"/>
-                  </a:schemeClr>
-                </a:solidFill>
-              </a:rPr>
-              <a:t>1. </a:t>
-            </a:r>
-            <a:r>
-              <a:rPr lang="ru-RU" sz="2200" dirty="0" smtClean="0">
-                <a:solidFill>
-                  <a:schemeClr val="tx1">
-                    <a:lumMod val="75000"/>
-                    <a:lumOff val="25000"/>
-                  </a:schemeClr>
-                </a:solidFill>
-              </a:rPr>
-              <a:t>Группы видов тестирования</a:t>
-            </a:r>
-            <a:endParaRPr lang="en-US" sz="2200" dirty="0">
-              <a:solidFill>
-                <a:schemeClr val="tx1">
-                  <a:lumMod val="75000"/>
-                  <a:lumOff val="25000"/>
-                </a:schemeClr>
-              </a:solidFill>
-            </a:endParaRPr>
-          </a:p>
-        </p:txBody>
-      </p:sp>
-      <p:sp>
-        <p:nvSpPr>
-          <p:cNvPr id="4" name="Rectangle 3"/>
-          <p:cNvSpPr/>
-          <p:nvPr/>
-        </p:nvSpPr>
-        <p:spPr>
-          <a:xfrm>
-            <a:off x="899592" y="1917993"/>
-            <a:ext cx="5022016" cy="430887"/>
-          </a:xfrm>
-          <a:prstGeom prst="rect">
-            <a:avLst/>
-          </a:prstGeom>
-        </p:spPr>
-        <p:txBody>
-          <a:bodyPr wrap="none">
-            <a:spAutoFit/>
-          </a:bodyPr>
-          <a:lstStyle/>
-          <a:p>
-            <a:r>
-              <a:rPr lang="en-US" sz="2200" dirty="0" smtClean="0">
-                <a:solidFill>
-                  <a:schemeClr val="tx1">
-                    <a:lumMod val="75000"/>
-                    <a:lumOff val="25000"/>
-                  </a:schemeClr>
-                </a:solidFill>
-              </a:rPr>
-              <a:t>2. </a:t>
-            </a:r>
-            <a:r>
-              <a:rPr lang="ru-RU" sz="2200" dirty="0" smtClean="0">
-                <a:solidFill>
-                  <a:schemeClr val="tx1">
-                    <a:lumMod val="75000"/>
-                    <a:lumOff val="25000"/>
-                  </a:schemeClr>
-                </a:solidFill>
-              </a:rPr>
-              <a:t>Описание каждого типа тестирования</a:t>
-            </a:r>
-            <a:endParaRPr lang="en-US" sz="2200" dirty="0">
-              <a:solidFill>
-                <a:schemeClr val="tx1">
-                  <a:lumMod val="75000"/>
-                  <a:lumOff val="25000"/>
-                </a:schemeClr>
-              </a:solidFill>
-            </a:endParaRPr>
-          </a:p>
-        </p:txBody>
-      </p:sp>
-      <p:sp>
-        <p:nvSpPr>
-          <p:cNvPr id="6" name="Rectangle 5"/>
-          <p:cNvSpPr/>
-          <p:nvPr/>
-        </p:nvSpPr>
-        <p:spPr>
-          <a:xfrm>
-            <a:off x="914400" y="2422048"/>
-            <a:ext cx="7883890" cy="430887"/>
-          </a:xfrm>
-          <a:prstGeom prst="rect">
-            <a:avLst/>
-          </a:prstGeom>
-        </p:spPr>
-        <p:txBody>
-          <a:bodyPr wrap="none">
-            <a:spAutoFit/>
-          </a:bodyPr>
-          <a:lstStyle/>
-          <a:p>
-            <a:r>
-              <a:rPr lang="en-US" sz="2200" dirty="0" smtClean="0">
-                <a:solidFill>
-                  <a:schemeClr val="tx1">
-                    <a:lumMod val="75000"/>
-                    <a:lumOff val="25000"/>
-                  </a:schemeClr>
-                </a:solidFill>
-              </a:rPr>
-              <a:t>3. </a:t>
-            </a:r>
-            <a:r>
-              <a:rPr lang="ru-RU" sz="2200" dirty="0" smtClean="0">
-                <a:solidFill>
-                  <a:schemeClr val="tx1">
-                    <a:lumMod val="75000"/>
-                    <a:lumOff val="25000"/>
-                  </a:schemeClr>
-                </a:solidFill>
-              </a:rPr>
-              <a:t>Преимущества и недостатки использования различных видов</a:t>
-            </a:r>
-            <a:endParaRPr lang="en-US" sz="2200" dirty="0">
-              <a:solidFill>
-                <a:schemeClr val="tx1">
-                  <a:lumMod val="75000"/>
-                  <a:lumOff val="25000"/>
-                </a:schemeClr>
-              </a:solidFill>
-            </a:endParaRPr>
-          </a:p>
-        </p:txBody>
-      </p:sp>
-      <p:sp>
-        <p:nvSpPr>
-          <p:cNvPr id="7" name="Rectangle 6"/>
-          <p:cNvSpPr/>
-          <p:nvPr/>
-        </p:nvSpPr>
-        <p:spPr>
-          <a:xfrm>
-            <a:off x="899592" y="2931457"/>
-            <a:ext cx="7632848" cy="430887"/>
-          </a:xfrm>
-          <a:prstGeom prst="rect">
-            <a:avLst/>
-          </a:prstGeom>
-        </p:spPr>
-        <p:txBody>
-          <a:bodyPr wrap="square">
-            <a:spAutoFit/>
-          </a:bodyPr>
-          <a:lstStyle/>
-          <a:p>
-            <a:r>
-              <a:rPr lang="en-US" sz="2200" dirty="0" smtClean="0">
-                <a:solidFill>
-                  <a:schemeClr val="tx1">
-                    <a:lumMod val="75000"/>
-                    <a:lumOff val="25000"/>
-                  </a:schemeClr>
-                </a:solidFill>
-              </a:rPr>
-              <a:t>4. </a:t>
-            </a:r>
-            <a:r>
-              <a:rPr lang="ru-RU" sz="2200" dirty="0" smtClean="0">
-                <a:solidFill>
-                  <a:schemeClr val="tx1">
-                    <a:lumMod val="75000"/>
-                    <a:lumOff val="25000"/>
-                  </a:schemeClr>
-                </a:solidFill>
-              </a:rPr>
-              <a:t>Примеры различных видов тестирования</a:t>
-            </a:r>
-            <a:endParaRPr lang="en-US" sz="2200" dirty="0">
-              <a:solidFill>
-                <a:schemeClr val="tx1">
-                  <a:lumMod val="75000"/>
-                  <a:lumOff val="25000"/>
-                </a:schemeClr>
-              </a:solidFill>
-            </a:endParaRPr>
-          </a:p>
-        </p:txBody>
-      </p:sp>
-    </p:spTree>
-    <p:extLst>
-      <p:ext uri="{BB962C8B-B14F-4D97-AF65-F5344CB8AC3E}">
-        <p14:creationId xmlns:p14="http://schemas.microsoft.com/office/powerpoint/2010/main" val="9039911"/>
-      </p:ext>
-    </p:extLst>
-  </p:cSld>
-  <p:clrMapOvr>
-    <a:masterClrMapping/>
-  </p:clrMapOvr>
-  <p:timing>
-    <p:tnLst>
-      <p:par>
-        <p:cTn id="1" dur="indefinite" restart="never" nodeType="tmRoot"/>
-      </p:par>
-    </p:tnLst>
-  </p:timing>
-</p:sld>
-</file>
-
-<file path=ppt/slides/slide20.xml><?xml version="1.0" encoding="utf-8"?>
+<file path=ppt/slides/slide21.xml><?xml version="1.0" encoding="utf-8"?>
 <p:sld xmlns:a="http://schemas.openxmlformats.org/drawingml/2006/main" xmlns:r="http://schemas.openxmlformats.org/officeDocument/2006/relationships" xmlns:p="http://schemas.openxmlformats.org/presentationml/2006/main">
   <p:cSld>
     <p:spTree>
@@ -10763,7 +12371,7 @@
 </p:sld>
 </file>
 
-<file path=ppt/slides/slide21.xml><?xml version="1.0" encoding="utf-8"?>
+<file path=ppt/slides/slide22.xml><?xml version="1.0" encoding="utf-8"?>
 <p:sld xmlns:a="http://schemas.openxmlformats.org/drawingml/2006/main" xmlns:r="http://schemas.openxmlformats.org/officeDocument/2006/relationships" xmlns:p="http://schemas.openxmlformats.org/presentationml/2006/main">
   <p:cSld>
     <p:spTree>
@@ -11815,7 +13423,7 @@
 </p:sld>
 </file>
 
-<file path=ppt/slides/slide22.xml><?xml version="1.0" encoding="utf-8"?>
+<file path=ppt/slides/slide23.xml><?xml version="1.0" encoding="utf-8"?>
 <p:sld xmlns:a="http://schemas.openxmlformats.org/drawingml/2006/main" xmlns:r="http://schemas.openxmlformats.org/officeDocument/2006/relationships" xmlns:p="http://schemas.openxmlformats.org/presentationml/2006/main">
   <p:cSld>
     <p:spTree>
@@ -15227,11 +16835,7 @@
             </a:r>
             <a:r>
               <a:rPr lang="ru-RU" sz="1400" dirty="0" smtClean="0"/>
-              <a:t>(тестирование установки / инсталляции</a:t>
-            </a:r>
-            <a:r>
-              <a:rPr lang="ru-RU" sz="1400" dirty="0" smtClean="0"/>
-              <a:t>)</a:t>
+              <a:t>(тестирование установки / инсталляции)</a:t>
             </a:r>
             <a:endParaRPr lang="en-US" sz="1400" dirty="0"/>
           </a:p>
@@ -15859,10 +17463,10 @@
           <a:p>
             <a:pPr algn="ctr"/>
             <a:r>
-              <a:rPr lang="en-US" sz="1300" dirty="0">
+              <a:rPr lang="en-US" sz="1300" dirty="0" smtClean="0">
                 <a:latin typeface="Georgia (Body)"/>
               </a:rPr>
-              <a:t>Exploratory Testing</a:t>
+              <a:t>Testability)</a:t>
             </a:r>
             <a:endParaRPr lang="en-US" sz="1300" dirty="0">
               <a:latin typeface="Georgia (Body)"/>

</xml_diff>